<commit_message>
webpage tweaks, added ppt slides for webpage dev
</commit_message>
<xml_diff>
--- a/Rental Listings in US Major Metros.pptx
+++ b/Rental Listings in US Major Metros.pptx
@@ -14,6 +14,10 @@
     <p:sldId id="262" r:id="rId8"/>
     <p:sldId id="263" r:id="rId9"/>
     <p:sldId id="264" r:id="rId10"/>
+    <p:sldId id="265" r:id="rId11"/>
+    <p:sldId id="268" r:id="rId12"/>
+    <p:sldId id="266" r:id="rId13"/>
+    <p:sldId id="267" r:id="rId14"/>
   </p:sldIdLst>
   <p:sldSz cx="12192000" cy="6858000"/>
   <p:notesSz cx="6858000" cy="9144000"/>
@@ -112,6 +116,11 @@
       </a:defRPr>
     </a:lvl9pPr>
   </p:defaultTextStyle>
+  <p:extLst>
+    <p:ext uri="{EFAFB233-063F-42B5-8137-9DF3F51BA10A}">
+      <p15:sldGuideLst xmlns:p15="http://schemas.microsoft.com/office/powerpoint/2012/main"/>
+    </p:ext>
+  </p:extLst>
 </p:presentation>
 </file>
 
@@ -1058,7 +1067,7 @@
           <a:p>
             <a:fld id="{72345051-2045-45DA-935E-2E3CA1A69ADC}" type="datetimeFigureOut">
               <a:rPr lang="en-US" smtClean="0"/>
-              <a:t>2/23/2023</a:t>
+              <a:t>2/27/2023</a:t>
             </a:fld>
             <a:endParaRPr lang="en-US" dirty="0"/>
           </a:p>
@@ -1256,7 +1265,7 @@
           <a:p>
             <a:fld id="{72345051-2045-45DA-935E-2E3CA1A69ADC}" type="datetimeFigureOut">
               <a:rPr lang="en-US" smtClean="0"/>
-              <a:t>2/23/2023</a:t>
+              <a:t>2/27/2023</a:t>
             </a:fld>
             <a:endParaRPr lang="en-US"/>
           </a:p>
@@ -1464,7 +1473,7 @@
           <a:p>
             <a:fld id="{72345051-2045-45DA-935E-2E3CA1A69ADC}" type="datetimeFigureOut">
               <a:rPr lang="en-US" smtClean="0"/>
-              <a:t>2/23/2023</a:t>
+              <a:t>2/27/2023</a:t>
             </a:fld>
             <a:endParaRPr lang="en-US"/>
           </a:p>
@@ -1691,7 +1700,7 @@
           <a:p>
             <a:fld id="{72345051-2045-45DA-935E-2E3CA1A69ADC}" type="datetimeFigureOut">
               <a:rPr lang="en-US" smtClean="0"/>
-              <a:t>2/23/2023</a:t>
+              <a:t>2/27/2023</a:t>
             </a:fld>
             <a:endParaRPr lang="en-US"/>
           </a:p>
@@ -2602,7 +2611,7 @@
           <a:p>
             <a:fld id="{72345051-2045-45DA-935E-2E3CA1A69ADC}" type="datetimeFigureOut">
               <a:rPr lang="en-US" smtClean="0"/>
-              <a:t>2/23/2023</a:t>
+              <a:t>2/27/2023</a:t>
             </a:fld>
             <a:endParaRPr lang="en-US"/>
           </a:p>
@@ -3205,7 +3214,7 @@
           <a:p>
             <a:fld id="{72345051-2045-45DA-935E-2E3CA1A69ADC}" type="datetimeFigureOut">
               <a:rPr lang="en-US" smtClean="0"/>
-              <a:t>2/23/2023</a:t>
+              <a:t>2/27/2023</a:t>
             </a:fld>
             <a:endParaRPr lang="en-US"/>
           </a:p>
@@ -4253,7 +4262,7 @@
           <a:p>
             <a:fld id="{72345051-2045-45DA-935E-2E3CA1A69ADC}" type="datetimeFigureOut">
               <a:rPr lang="en-US" smtClean="0"/>
-              <a:t>2/23/2023</a:t>
+              <a:t>2/27/2023</a:t>
             </a:fld>
             <a:endParaRPr lang="en-US"/>
           </a:p>
@@ -5037,7 +5046,7 @@
           <a:p>
             <a:fld id="{72345051-2045-45DA-935E-2E3CA1A69ADC}" type="datetimeFigureOut">
               <a:rPr lang="en-US" smtClean="0"/>
-              <a:t>2/23/2023</a:t>
+              <a:t>2/27/2023</a:t>
             </a:fld>
             <a:endParaRPr lang="en-US"/>
           </a:p>
@@ -5486,7 +5495,7 @@
           <a:p>
             <a:fld id="{72345051-2045-45DA-935E-2E3CA1A69ADC}" type="datetimeFigureOut">
               <a:rPr lang="en-US" smtClean="0"/>
-              <a:t>2/23/2023</a:t>
+              <a:t>2/27/2023</a:t>
             </a:fld>
             <a:endParaRPr lang="en-US"/>
           </a:p>
@@ -5803,7 +5812,7 @@
           <a:p>
             <a:fld id="{72345051-2045-45DA-935E-2E3CA1A69ADC}" type="datetimeFigureOut">
               <a:rPr lang="en-US" smtClean="0"/>
-              <a:t>2/23/2023</a:t>
+              <a:t>2/27/2023</a:t>
             </a:fld>
             <a:endParaRPr lang="en-US"/>
           </a:p>
@@ -6431,7 +6440,7 @@
           <a:p>
             <a:fld id="{72345051-2045-45DA-935E-2E3CA1A69ADC}" type="datetimeFigureOut">
               <a:rPr lang="en-US" smtClean="0"/>
-              <a:t>2/23/2023</a:t>
+              <a:t>2/27/2023</a:t>
             </a:fld>
             <a:endParaRPr lang="en-US"/>
           </a:p>
@@ -7004,7 +7013,7 @@
           <a:p>
             <a:fld id="{72345051-2045-45DA-935E-2E3CA1A69ADC}" type="datetimeFigureOut">
               <a:rPr lang="en-US" smtClean="0"/>
-              <a:t>2/23/2023</a:t>
+              <a:t>2/27/2023</a:t>
             </a:fld>
             <a:endParaRPr lang="en-US" dirty="0"/>
           </a:p>
@@ -7952,6 +7961,472 @@
 </p:sld>
 </file>
 
+<file path=ppt/slides/slide10.xml><?xml version="1.0" encoding="utf-8"?>
+<p:sld xmlns:a="http://schemas.openxmlformats.org/drawingml/2006/main" xmlns:r="http://schemas.openxmlformats.org/officeDocument/2006/relationships" xmlns:p="http://schemas.openxmlformats.org/presentationml/2006/main">
+  <p:cSld>
+    <p:spTree>
+      <p:nvGrpSpPr>
+        <p:cNvPr id="1" name=""/>
+        <p:cNvGrpSpPr/>
+        <p:nvPr/>
+      </p:nvGrpSpPr>
+      <p:grpSpPr>
+        <a:xfrm>
+          <a:off x="0" y="0"/>
+          <a:ext cx="0" cy="0"/>
+          <a:chOff x="0" y="0"/>
+          <a:chExt cx="0" cy="0"/>
+        </a:xfrm>
+      </p:grpSpPr>
+      <p:sp>
+        <p:nvSpPr>
+          <p:cNvPr id="2" name="Title 1">
+            <a:extLst>
+              <a:ext uri="{FF2B5EF4-FFF2-40B4-BE49-F238E27FC236}">
+                <a16:creationId xmlns:a16="http://schemas.microsoft.com/office/drawing/2014/main" id="{C5108A4B-C1E3-E2F2-A0AE-72D534195565}"/>
+              </a:ext>
+            </a:extLst>
+          </p:cNvPr>
+          <p:cNvSpPr>
+            <a:spLocks noGrp="1"/>
+          </p:cNvSpPr>
+          <p:nvPr>
+            <p:ph type="title"/>
+          </p:nvPr>
+        </p:nvSpPr>
+        <p:spPr/>
+        <p:txBody>
+          <a:bodyPr/>
+          <a:lstStyle/>
+          <a:p>
+            <a:r>
+              <a:rPr lang="en-US" dirty="0"/>
+              <a:t>Flask App</a:t>
+            </a:r>
+          </a:p>
+        </p:txBody>
+      </p:sp>
+      <p:sp>
+        <p:nvSpPr>
+          <p:cNvPr id="3" name="Content Placeholder 2">
+            <a:extLst>
+              <a:ext uri="{FF2B5EF4-FFF2-40B4-BE49-F238E27FC236}">
+                <a16:creationId xmlns:a16="http://schemas.microsoft.com/office/drawing/2014/main" id="{A5C345E8-19B3-BE06-65B7-6DF04551F820}"/>
+              </a:ext>
+            </a:extLst>
+          </p:cNvPr>
+          <p:cNvSpPr>
+            <a:spLocks noGrp="1"/>
+          </p:cNvSpPr>
+          <p:nvPr>
+            <p:ph idx="1"/>
+          </p:nvPr>
+        </p:nvSpPr>
+        <p:spPr/>
+        <p:txBody>
+          <a:bodyPr/>
+          <a:lstStyle/>
+          <a:p>
+            <a:r>
+              <a:rPr lang="en-US" dirty="0"/>
+              <a:t>A rudimentary Flask app was set up with three basic endpoints.</a:t>
+            </a:r>
+          </a:p>
+          <a:p>
+            <a:pPr lvl="1"/>
+            <a:r>
+              <a:rPr lang="en-US" dirty="0"/>
+              <a:t>Index/Homepage directory</a:t>
+            </a:r>
+          </a:p>
+          <a:p>
+            <a:pPr lvl="1"/>
+            <a:r>
+              <a:rPr lang="en-US" dirty="0"/>
+              <a:t>Search engine</a:t>
+            </a:r>
+          </a:p>
+          <a:p>
+            <a:pPr lvl="1"/>
+            <a:r>
+              <a:rPr lang="en-US" dirty="0"/>
+              <a:t>Data Analysis presentation</a:t>
+            </a:r>
+          </a:p>
+        </p:txBody>
+      </p:sp>
+    </p:spTree>
+    <p:extLst>
+      <p:ext uri="{BB962C8B-B14F-4D97-AF65-F5344CB8AC3E}">
+        <p14:creationId xmlns:p14="http://schemas.microsoft.com/office/powerpoint/2010/main" val="498134016"/>
+      </p:ext>
+    </p:extLst>
+  </p:cSld>
+  <p:clrMapOvr>
+    <a:masterClrMapping/>
+  </p:clrMapOvr>
+</p:sld>
+</file>
+
+<file path=ppt/slides/slide11.xml><?xml version="1.0" encoding="utf-8"?>
+<p:sld xmlns:a="http://schemas.openxmlformats.org/drawingml/2006/main" xmlns:r="http://schemas.openxmlformats.org/officeDocument/2006/relationships" xmlns:p="http://schemas.openxmlformats.org/presentationml/2006/main">
+  <p:cSld>
+    <p:spTree>
+      <p:nvGrpSpPr>
+        <p:cNvPr id="1" name=""/>
+        <p:cNvGrpSpPr/>
+        <p:nvPr/>
+      </p:nvGrpSpPr>
+      <p:grpSpPr>
+        <a:xfrm>
+          <a:off x="0" y="0"/>
+          <a:ext cx="0" cy="0"/>
+          <a:chOff x="0" y="0"/>
+          <a:chExt cx="0" cy="0"/>
+        </a:xfrm>
+      </p:grpSpPr>
+      <p:sp>
+        <p:nvSpPr>
+          <p:cNvPr id="2" name="Title 1">
+            <a:extLst>
+              <a:ext uri="{FF2B5EF4-FFF2-40B4-BE49-F238E27FC236}">
+                <a16:creationId xmlns:a16="http://schemas.microsoft.com/office/drawing/2014/main" id="{F8DEE7F4-98A8-2E33-E40F-24545FB289C2}"/>
+              </a:ext>
+            </a:extLst>
+          </p:cNvPr>
+          <p:cNvSpPr>
+            <a:spLocks noGrp="1"/>
+          </p:cNvSpPr>
+          <p:nvPr>
+            <p:ph type="title"/>
+          </p:nvPr>
+        </p:nvSpPr>
+        <p:spPr/>
+        <p:txBody>
+          <a:bodyPr/>
+          <a:lstStyle/>
+          <a:p>
+            <a:r>
+              <a:rPr lang="en-US" dirty="0"/>
+              <a:t>Index Page</a:t>
+            </a:r>
+          </a:p>
+        </p:txBody>
+      </p:sp>
+      <p:sp>
+        <p:nvSpPr>
+          <p:cNvPr id="3" name="Content Placeholder 2">
+            <a:extLst>
+              <a:ext uri="{FF2B5EF4-FFF2-40B4-BE49-F238E27FC236}">
+                <a16:creationId xmlns:a16="http://schemas.microsoft.com/office/drawing/2014/main" id="{157229B8-1243-8268-2334-4B3DF2698BED}"/>
+              </a:ext>
+            </a:extLst>
+          </p:cNvPr>
+          <p:cNvSpPr>
+            <a:spLocks noGrp="1"/>
+          </p:cNvSpPr>
+          <p:nvPr>
+            <p:ph idx="1"/>
+          </p:nvPr>
+        </p:nvSpPr>
+        <p:spPr/>
+        <p:txBody>
+          <a:bodyPr/>
+          <a:lstStyle/>
+          <a:p>
+            <a:r>
+              <a:rPr lang="en-US" dirty="0"/>
+              <a:t>Our index page presented our project proposal, hypotheses, resources, and links to the two feature-laden endpoints.</a:t>
+            </a:r>
+          </a:p>
+        </p:txBody>
+      </p:sp>
+      <p:pic>
+        <p:nvPicPr>
+          <p:cNvPr id="5" name="Picture 4">
+            <a:extLst>
+              <a:ext uri="{FF2B5EF4-FFF2-40B4-BE49-F238E27FC236}">
+                <a16:creationId xmlns:a16="http://schemas.microsoft.com/office/drawing/2014/main" id="{7DFFECFE-4300-05D2-8B8F-766BC8AFA060}"/>
+              </a:ext>
+            </a:extLst>
+          </p:cNvPr>
+          <p:cNvPicPr>
+            <a:picLocks noChangeAspect="1"/>
+          </p:cNvPicPr>
+          <p:nvPr/>
+        </p:nvPicPr>
+        <p:blipFill>
+          <a:blip r:embed="rId2"/>
+          <a:stretch>
+            <a:fillRect/>
+          </a:stretch>
+        </p:blipFill>
+        <p:spPr>
+          <a:xfrm>
+            <a:off x="1878931" y="2210431"/>
+            <a:ext cx="8434138" cy="3701220"/>
+          </a:xfrm>
+          <a:prstGeom prst="rect">
+            <a:avLst/>
+          </a:prstGeom>
+        </p:spPr>
+      </p:pic>
+    </p:spTree>
+    <p:extLst>
+      <p:ext uri="{BB962C8B-B14F-4D97-AF65-F5344CB8AC3E}">
+        <p14:creationId xmlns:p14="http://schemas.microsoft.com/office/powerpoint/2010/main" val="439797583"/>
+      </p:ext>
+    </p:extLst>
+  </p:cSld>
+  <p:clrMapOvr>
+    <a:masterClrMapping/>
+  </p:clrMapOvr>
+</p:sld>
+</file>
+
+<file path=ppt/slides/slide12.xml><?xml version="1.0" encoding="utf-8"?>
+<p:sld xmlns:a="http://schemas.openxmlformats.org/drawingml/2006/main" xmlns:r="http://schemas.openxmlformats.org/officeDocument/2006/relationships" xmlns:p="http://schemas.openxmlformats.org/presentationml/2006/main">
+  <p:cSld>
+    <p:spTree>
+      <p:nvGrpSpPr>
+        <p:cNvPr id="1" name=""/>
+        <p:cNvGrpSpPr/>
+        <p:nvPr/>
+      </p:nvGrpSpPr>
+      <p:grpSpPr>
+        <a:xfrm>
+          <a:off x="0" y="0"/>
+          <a:ext cx="0" cy="0"/>
+          <a:chOff x="0" y="0"/>
+          <a:chExt cx="0" cy="0"/>
+        </a:xfrm>
+      </p:grpSpPr>
+      <p:sp>
+        <p:nvSpPr>
+          <p:cNvPr id="2" name="Title 1">
+            <a:extLst>
+              <a:ext uri="{FF2B5EF4-FFF2-40B4-BE49-F238E27FC236}">
+                <a16:creationId xmlns:a16="http://schemas.microsoft.com/office/drawing/2014/main" id="{1BBF555B-987E-D92D-A507-533AEF25BE6D}"/>
+              </a:ext>
+            </a:extLst>
+          </p:cNvPr>
+          <p:cNvSpPr>
+            <a:spLocks noGrp="1"/>
+          </p:cNvSpPr>
+          <p:nvPr>
+            <p:ph type="title"/>
+          </p:nvPr>
+        </p:nvSpPr>
+        <p:spPr/>
+        <p:txBody>
+          <a:bodyPr/>
+          <a:lstStyle/>
+          <a:p>
+            <a:r>
+              <a:rPr lang="en-US" dirty="0"/>
+              <a:t>Search</a:t>
+            </a:r>
+          </a:p>
+        </p:txBody>
+      </p:sp>
+      <p:sp>
+        <p:nvSpPr>
+          <p:cNvPr id="3" name="Content Placeholder 2">
+            <a:extLst>
+              <a:ext uri="{FF2B5EF4-FFF2-40B4-BE49-F238E27FC236}">
+                <a16:creationId xmlns:a16="http://schemas.microsoft.com/office/drawing/2014/main" id="{9D47D669-6003-4C95-DEAC-D728A4991316}"/>
+              </a:ext>
+            </a:extLst>
+          </p:cNvPr>
+          <p:cNvSpPr>
+            <a:spLocks noGrp="1"/>
+          </p:cNvSpPr>
+          <p:nvPr>
+            <p:ph idx="1"/>
+          </p:nvPr>
+        </p:nvSpPr>
+        <p:spPr>
+          <a:xfrm>
+            <a:off x="838200" y="1392611"/>
+            <a:ext cx="3120189" cy="4788733"/>
+          </a:xfrm>
+        </p:spPr>
+        <p:txBody>
+          <a:bodyPr/>
+          <a:lstStyle/>
+          <a:p>
+            <a:r>
+              <a:rPr lang="en-US" dirty="0"/>
+              <a:t>The full search functionality is not yet completed. We currently lack the database query/database connection.</a:t>
+            </a:r>
+          </a:p>
+          <a:p>
+            <a:r>
+              <a:rPr lang="en-US" dirty="0"/>
+              <a:t>We do, however, correctly store the user’s selections as shown in the console log.</a:t>
+            </a:r>
+          </a:p>
+        </p:txBody>
+      </p:sp>
+      <p:pic>
+        <p:nvPicPr>
+          <p:cNvPr id="7" name="Picture 6">
+            <a:extLst>
+              <a:ext uri="{FF2B5EF4-FFF2-40B4-BE49-F238E27FC236}">
+                <a16:creationId xmlns:a16="http://schemas.microsoft.com/office/drawing/2014/main" id="{87E1981E-460F-D56F-CF65-1DC833E154D9}"/>
+              </a:ext>
+            </a:extLst>
+          </p:cNvPr>
+          <p:cNvPicPr>
+            <a:picLocks noChangeAspect="1"/>
+          </p:cNvPicPr>
+          <p:nvPr/>
+        </p:nvPicPr>
+        <p:blipFill>
+          <a:blip r:embed="rId2"/>
+          <a:stretch>
+            <a:fillRect/>
+          </a:stretch>
+        </p:blipFill>
+        <p:spPr>
+          <a:xfrm>
+            <a:off x="4403558" y="1392610"/>
+            <a:ext cx="6950242" cy="4847295"/>
+          </a:xfrm>
+          <a:prstGeom prst="rect">
+            <a:avLst/>
+          </a:prstGeom>
+        </p:spPr>
+      </p:pic>
+    </p:spTree>
+    <p:extLst>
+      <p:ext uri="{BB962C8B-B14F-4D97-AF65-F5344CB8AC3E}">
+        <p14:creationId xmlns:p14="http://schemas.microsoft.com/office/powerpoint/2010/main" val="2787833558"/>
+      </p:ext>
+    </p:extLst>
+  </p:cSld>
+  <p:clrMapOvr>
+    <a:masterClrMapping/>
+  </p:clrMapOvr>
+</p:sld>
+</file>
+
+<file path=ppt/slides/slide13.xml><?xml version="1.0" encoding="utf-8"?>
+<p:sld xmlns:a="http://schemas.openxmlformats.org/drawingml/2006/main" xmlns:r="http://schemas.openxmlformats.org/officeDocument/2006/relationships" xmlns:p="http://schemas.openxmlformats.org/presentationml/2006/main">
+  <p:cSld>
+    <p:spTree>
+      <p:nvGrpSpPr>
+        <p:cNvPr id="1" name=""/>
+        <p:cNvGrpSpPr/>
+        <p:nvPr/>
+      </p:nvGrpSpPr>
+      <p:grpSpPr>
+        <a:xfrm>
+          <a:off x="0" y="0"/>
+          <a:ext cx="0" cy="0"/>
+          <a:chOff x="0" y="0"/>
+          <a:chExt cx="0" cy="0"/>
+        </a:xfrm>
+      </p:grpSpPr>
+      <p:sp>
+        <p:nvSpPr>
+          <p:cNvPr id="2" name="Title 1">
+            <a:extLst>
+              <a:ext uri="{FF2B5EF4-FFF2-40B4-BE49-F238E27FC236}">
+                <a16:creationId xmlns:a16="http://schemas.microsoft.com/office/drawing/2014/main" id="{24571719-D727-3B83-689E-822900953F5C}"/>
+              </a:ext>
+            </a:extLst>
+          </p:cNvPr>
+          <p:cNvSpPr>
+            <a:spLocks noGrp="1"/>
+          </p:cNvSpPr>
+          <p:nvPr>
+            <p:ph type="title"/>
+          </p:nvPr>
+        </p:nvSpPr>
+        <p:spPr/>
+        <p:txBody>
+          <a:bodyPr/>
+          <a:lstStyle/>
+          <a:p>
+            <a:r>
+              <a:rPr lang="en-US" dirty="0"/>
+              <a:t>Data Analysis</a:t>
+            </a:r>
+          </a:p>
+        </p:txBody>
+      </p:sp>
+      <p:sp>
+        <p:nvSpPr>
+          <p:cNvPr id="3" name="Content Placeholder 2">
+            <a:extLst>
+              <a:ext uri="{FF2B5EF4-FFF2-40B4-BE49-F238E27FC236}">
+                <a16:creationId xmlns:a16="http://schemas.microsoft.com/office/drawing/2014/main" id="{64841190-232F-917D-0212-EAEEFE5ED6A9}"/>
+              </a:ext>
+            </a:extLst>
+          </p:cNvPr>
+          <p:cNvSpPr>
+            <a:spLocks noGrp="1"/>
+          </p:cNvSpPr>
+          <p:nvPr>
+            <p:ph idx="1"/>
+          </p:nvPr>
+        </p:nvSpPr>
+        <p:spPr/>
+        <p:txBody>
+          <a:bodyPr/>
+          <a:lstStyle/>
+          <a:p>
+            <a:r>
+              <a:rPr lang="en-US" dirty="0"/>
+              <a:t>At this endpoint, we allow the user to select (using a dropdown menu) a category of analysis graphs to display.</a:t>
+            </a:r>
+          </a:p>
+        </p:txBody>
+      </p:sp>
+      <p:pic>
+        <p:nvPicPr>
+          <p:cNvPr id="9" name="Picture 8">
+            <a:extLst>
+              <a:ext uri="{FF2B5EF4-FFF2-40B4-BE49-F238E27FC236}">
+                <a16:creationId xmlns:a16="http://schemas.microsoft.com/office/drawing/2014/main" id="{BFFBFBBB-DF84-E3EB-5765-382B255AAA7B}"/>
+              </a:ext>
+            </a:extLst>
+          </p:cNvPr>
+          <p:cNvPicPr>
+            <a:picLocks noChangeAspect="1"/>
+          </p:cNvPicPr>
+          <p:nvPr/>
+        </p:nvPicPr>
+        <p:blipFill>
+          <a:blip r:embed="rId2"/>
+          <a:stretch>
+            <a:fillRect/>
+          </a:stretch>
+        </p:blipFill>
+        <p:spPr>
+          <a:xfrm>
+            <a:off x="2184929" y="2081463"/>
+            <a:ext cx="7822141" cy="4318922"/>
+          </a:xfrm>
+          <a:prstGeom prst="rect">
+            <a:avLst/>
+          </a:prstGeom>
+        </p:spPr>
+      </p:pic>
+    </p:spTree>
+    <p:extLst>
+      <p:ext uri="{BB962C8B-B14F-4D97-AF65-F5344CB8AC3E}">
+        <p14:creationId xmlns:p14="http://schemas.microsoft.com/office/powerpoint/2010/main" val="1848490679"/>
+      </p:ext>
+    </p:extLst>
+  </p:cSld>
+  <p:clrMapOvr>
+    <a:masterClrMapping/>
+  </p:clrMapOvr>
+</p:sld>
+</file>
+
 <file path=ppt/slides/slide2.xml><?xml version="1.0" encoding="utf-8"?>
 <p:sld xmlns:a="http://schemas.openxmlformats.org/drawingml/2006/main" xmlns:r="http://schemas.openxmlformats.org/officeDocument/2006/relationships" xmlns:p="http://schemas.openxmlformats.org/presentationml/2006/main">
   <p:cSld>
@@ -8026,7 +8501,7 @@
           <a:p>
             <a:r>
               <a:rPr lang="en-US" dirty="0"/>
-              <a:t>Section 2</a:t>
+              <a:t>Foundation of the Flask App + Website</a:t>
             </a:r>
           </a:p>
           <a:p>

</xml_diff>